<commit_message>
White paper and presentation updates
</commit_message>
<xml_diff>
--- a/WhitePaper/Semantics for Healthcare Data.pptx
+++ b/WhitePaper/Semantics for Healthcare Data.pptx
@@ -12,7 +12,7 @@
     <p:sldId id="262" r:id="rId6"/>
     <p:sldId id="263" r:id="rId7"/>
     <p:sldId id="264" r:id="rId8"/>
-    <p:sldId id="258" r:id="rId9"/>
+    <p:sldId id="265" r:id="rId9"/>
   </p:sldIdLst>
   <p:sldSz cx="12192000" cy="6858000"/>
   <p:notesSz cx="6858000" cy="9144000"/>
@@ -111,6 +111,11 @@
       </a:defRPr>
     </a:lvl9pPr>
   </p:defaultTextStyle>
+  <p:extLst>
+    <p:ext uri="{EFAFB233-063F-42B5-8137-9DF3F51BA10A}">
+      <p15:sldGuideLst xmlns:p15="http://schemas.microsoft.com/office/powerpoint/2012/main"/>
+    </p:ext>
+  </p:extLst>
 </p:presentation>
 </file>
 
@@ -261,7 +266,7 @@
           <a:p>
             <a:fld id="{020D0AF2-8150-483B-8AB5-B8BDCF551044}" type="datetimeFigureOut">
               <a:rPr lang="en-US" smtClean="0"/>
-              <a:t>3/18/2022</a:t>
+              <a:t>3/22/2022</a:t>
             </a:fld>
             <a:endParaRPr lang="en-US"/>
           </a:p>
@@ -459,7 +464,7 @@
           <a:p>
             <a:fld id="{020D0AF2-8150-483B-8AB5-B8BDCF551044}" type="datetimeFigureOut">
               <a:rPr lang="en-US" smtClean="0"/>
-              <a:t>3/18/2022</a:t>
+              <a:t>3/22/2022</a:t>
             </a:fld>
             <a:endParaRPr lang="en-US"/>
           </a:p>
@@ -667,7 +672,7 @@
           <a:p>
             <a:fld id="{020D0AF2-8150-483B-8AB5-B8BDCF551044}" type="datetimeFigureOut">
               <a:rPr lang="en-US" smtClean="0"/>
-              <a:t>3/18/2022</a:t>
+              <a:t>3/22/2022</a:t>
             </a:fld>
             <a:endParaRPr lang="en-US"/>
           </a:p>
@@ -865,7 +870,7 @@
           <a:p>
             <a:fld id="{020D0AF2-8150-483B-8AB5-B8BDCF551044}" type="datetimeFigureOut">
               <a:rPr lang="en-US" smtClean="0"/>
-              <a:t>3/18/2022</a:t>
+              <a:t>3/22/2022</a:t>
             </a:fld>
             <a:endParaRPr lang="en-US"/>
           </a:p>
@@ -1140,7 +1145,7 @@
           <a:p>
             <a:fld id="{020D0AF2-8150-483B-8AB5-B8BDCF551044}" type="datetimeFigureOut">
               <a:rPr lang="en-US" smtClean="0"/>
-              <a:t>3/18/2022</a:t>
+              <a:t>3/22/2022</a:t>
             </a:fld>
             <a:endParaRPr lang="en-US"/>
           </a:p>
@@ -1405,7 +1410,7 @@
           <a:p>
             <a:fld id="{020D0AF2-8150-483B-8AB5-B8BDCF551044}" type="datetimeFigureOut">
               <a:rPr lang="en-US" smtClean="0"/>
-              <a:t>3/18/2022</a:t>
+              <a:t>3/22/2022</a:t>
             </a:fld>
             <a:endParaRPr lang="en-US"/>
           </a:p>
@@ -1817,7 +1822,7 @@
           <a:p>
             <a:fld id="{020D0AF2-8150-483B-8AB5-B8BDCF551044}" type="datetimeFigureOut">
               <a:rPr lang="en-US" smtClean="0"/>
-              <a:t>3/18/2022</a:t>
+              <a:t>3/22/2022</a:t>
             </a:fld>
             <a:endParaRPr lang="en-US"/>
           </a:p>
@@ -1958,7 +1963,7 @@
           <a:p>
             <a:fld id="{020D0AF2-8150-483B-8AB5-B8BDCF551044}" type="datetimeFigureOut">
               <a:rPr lang="en-US" smtClean="0"/>
-              <a:t>3/18/2022</a:t>
+              <a:t>3/22/2022</a:t>
             </a:fld>
             <a:endParaRPr lang="en-US"/>
           </a:p>
@@ -2071,7 +2076,7 @@
           <a:p>
             <a:fld id="{020D0AF2-8150-483B-8AB5-B8BDCF551044}" type="datetimeFigureOut">
               <a:rPr lang="en-US" smtClean="0"/>
-              <a:t>3/18/2022</a:t>
+              <a:t>3/22/2022</a:t>
             </a:fld>
             <a:endParaRPr lang="en-US"/>
           </a:p>
@@ -2382,7 +2387,7 @@
           <a:p>
             <a:fld id="{020D0AF2-8150-483B-8AB5-B8BDCF551044}" type="datetimeFigureOut">
               <a:rPr lang="en-US" smtClean="0"/>
-              <a:t>3/18/2022</a:t>
+              <a:t>3/22/2022</a:t>
             </a:fld>
             <a:endParaRPr lang="en-US"/>
           </a:p>
@@ -2670,7 +2675,7 @@
           <a:p>
             <a:fld id="{020D0AF2-8150-483B-8AB5-B8BDCF551044}" type="datetimeFigureOut">
               <a:rPr lang="en-US" smtClean="0"/>
-              <a:t>3/18/2022</a:t>
+              <a:t>3/22/2022</a:t>
             </a:fld>
             <a:endParaRPr lang="en-US"/>
           </a:p>
@@ -2911,7 +2916,7 @@
           <a:p>
             <a:fld id="{020D0AF2-8150-483B-8AB5-B8BDCF551044}" type="datetimeFigureOut">
               <a:rPr lang="en-US" smtClean="0"/>
-              <a:t>3/18/2022</a:t>
+              <a:t>3/22/2022</a:t>
             </a:fld>
             <a:endParaRPr lang="en-US"/>
           </a:p>
@@ -7157,8 +7162,8 @@
         </p:blipFill>
         <p:spPr>
           <a:xfrm>
-            <a:off x="1477644" y="3246396"/>
-            <a:ext cx="9529445" cy="3335834"/>
+            <a:off x="3013368" y="3157041"/>
+            <a:ext cx="7713248" cy="3335834"/>
           </a:xfrm>
           <a:prstGeom prst="rect">
             <a:avLst/>
@@ -7166,6 +7171,106 @@
           <a:ln/>
         </p:spPr>
       </p:pic>
+      <p:sp>
+        <p:nvSpPr>
+          <p:cNvPr id="6" name="Arrow: Bent 5">
+            <a:extLst>
+              <a:ext uri="{FF2B5EF4-FFF2-40B4-BE49-F238E27FC236}">
+                <a16:creationId xmlns:a16="http://schemas.microsoft.com/office/drawing/2014/main" id="{79877D4A-07AD-4B9A-A8B1-48DCD0D9C744}"/>
+              </a:ext>
+            </a:extLst>
+          </p:cNvPr>
+          <p:cNvSpPr/>
+          <p:nvPr/>
+        </p:nvSpPr>
+        <p:spPr>
+          <a:xfrm flipV="1">
+            <a:off x="1465384" y="3821724"/>
+            <a:ext cx="1230923" cy="1312984"/>
+          </a:xfrm>
+          <a:prstGeom prst="bentArrow">
+            <a:avLst/>
+          </a:prstGeom>
+        </p:spPr>
+        <p:style>
+          <a:lnRef idx="2">
+            <a:schemeClr val="accent1">
+              <a:shade val="50000"/>
+            </a:schemeClr>
+          </a:lnRef>
+          <a:fillRef idx="1">
+            <a:schemeClr val="accent1"/>
+          </a:fillRef>
+          <a:effectRef idx="0">
+            <a:schemeClr val="accent1"/>
+          </a:effectRef>
+          <a:fontRef idx="minor">
+            <a:schemeClr val="lt1"/>
+          </a:fontRef>
+        </p:style>
+        <p:txBody>
+          <a:bodyPr rtlCol="0" anchor="ctr"/>
+          <a:lstStyle/>
+          <a:p>
+            <a:pPr algn="ctr"/>
+            <a:endParaRPr lang="en-US">
+              <a:solidFill>
+                <a:schemeClr val="tx1"/>
+              </a:solidFill>
+            </a:endParaRPr>
+          </a:p>
+        </p:txBody>
+      </p:sp>
+      <p:sp>
+        <p:nvSpPr>
+          <p:cNvPr id="7" name="TextBox 6">
+            <a:extLst>
+              <a:ext uri="{FF2B5EF4-FFF2-40B4-BE49-F238E27FC236}">
+                <a16:creationId xmlns:a16="http://schemas.microsoft.com/office/drawing/2014/main" id="{D2C96EA7-D43E-4971-A448-62C6773FB2E4}"/>
+              </a:ext>
+            </a:extLst>
+          </p:cNvPr>
+          <p:cNvSpPr txBox="1"/>
+          <p:nvPr/>
+        </p:nvSpPr>
+        <p:spPr>
+          <a:xfrm>
+            <a:off x="808368" y="2806061"/>
+            <a:ext cx="1766830" cy="1015663"/>
+          </a:xfrm>
+          <a:prstGeom prst="rect">
+            <a:avLst/>
+          </a:prstGeom>
+          <a:noFill/>
+        </p:spPr>
+        <p:txBody>
+          <a:bodyPr wrap="none" rtlCol="0">
+            <a:spAutoFit/>
+          </a:bodyPr>
+          <a:lstStyle/>
+          <a:p>
+            <a:pPr algn="ctr"/>
+            <a:r>
+              <a:rPr lang="en-US" sz="2000" i="1" dirty="0"/>
+              <a:t>“X” is </a:t>
+            </a:r>
+          </a:p>
+          <a:p>
+            <a:pPr algn="ctr"/>
+            <a:r>
+              <a:rPr lang="en-US" sz="2000" i="1" dirty="0"/>
+              <a:t>blood pressure </a:t>
+            </a:r>
+          </a:p>
+          <a:p>
+            <a:pPr algn="ctr"/>
+            <a:r>
+              <a:rPr lang="en-US" sz="2000" i="1" u="sng" dirty="0"/>
+              <a:t>Qualified</a:t>
+            </a:r>
+          </a:p>
+        </p:txBody>
+      </p:sp>
     </p:spTree>
     <p:extLst>
       <p:ext uri="{BB962C8B-B14F-4D97-AF65-F5344CB8AC3E}">
@@ -7196,12 +7301,72 @@
           <a:chExt cx="0" cy="0"/>
         </a:xfrm>
       </p:grpSpPr>
+      <p:sp>
+        <p:nvSpPr>
+          <p:cNvPr id="4" name="Title 3">
+            <a:extLst>
+              <a:ext uri="{FF2B5EF4-FFF2-40B4-BE49-F238E27FC236}">
+                <a16:creationId xmlns:a16="http://schemas.microsoft.com/office/drawing/2014/main" id="{97CF17C2-CB92-46C9-96BB-3133F7BA3ACB}"/>
+              </a:ext>
+            </a:extLst>
+          </p:cNvPr>
+          <p:cNvSpPr>
+            <a:spLocks noGrp="1"/>
+          </p:cNvSpPr>
+          <p:nvPr>
+            <p:ph type="title"/>
+          </p:nvPr>
+        </p:nvSpPr>
+        <p:spPr/>
+        <p:txBody>
+          <a:bodyPr>
+            <a:normAutofit/>
+          </a:bodyPr>
+          <a:lstStyle/>
+          <a:p>
+            <a:r>
+              <a:rPr lang="en-US" sz="3600" dirty="0"/>
+              <a:t>Binding of blood pressure “Situational Data Element”</a:t>
+            </a:r>
+          </a:p>
+        </p:txBody>
+      </p:sp>
+      <p:pic>
+        <p:nvPicPr>
+          <p:cNvPr id="5" name="image1.png" descr="Diagram&#10;&#10;Description automatically generated">
+            <a:extLst>
+              <a:ext uri="{FF2B5EF4-FFF2-40B4-BE49-F238E27FC236}">
+                <a16:creationId xmlns:a16="http://schemas.microsoft.com/office/drawing/2014/main" id="{93F16E55-E114-4E76-9DDB-1CB3B2155043}"/>
+              </a:ext>
+            </a:extLst>
+          </p:cNvPr>
+          <p:cNvPicPr/>
+          <p:nvPr/>
+        </p:nvPicPr>
+        <p:blipFill>
+          <a:blip r:embed="rId2"/>
+          <a:srcRect/>
+          <a:stretch>
+            <a:fillRect/>
+          </a:stretch>
+        </p:blipFill>
+        <p:spPr>
+          <a:xfrm>
+            <a:off x="13007" y="2026648"/>
+            <a:ext cx="6513362" cy="3980904"/>
+          </a:xfrm>
+          <a:prstGeom prst="rect">
+            <a:avLst/>
+          </a:prstGeom>
+          <a:ln/>
+        </p:spPr>
+      </p:pic>
       <p:grpSp>
         <p:nvGrpSpPr>
-          <p:cNvPr id="4" name="Group 3">
-            <a:extLst>
-              <a:ext uri="{FF2B5EF4-FFF2-40B4-BE49-F238E27FC236}">
-                <a16:creationId xmlns:a16="http://schemas.microsoft.com/office/drawing/2014/main" id="{6125122F-8C3D-4841-809D-1319DAA38D44}"/>
+          <p:cNvPr id="6" name="Group 5">
+            <a:extLst>
+              <a:ext uri="{FF2B5EF4-FFF2-40B4-BE49-F238E27FC236}">
+                <a16:creationId xmlns:a16="http://schemas.microsoft.com/office/drawing/2014/main" id="{A85937EE-AD61-412D-9245-4598AEB90ED1}"/>
               </a:ext>
             </a:extLst>
           </p:cNvPr>
@@ -7210,7 +7375,7 @@
         </p:nvGrpSpPr>
         <p:grpSpPr>
           <a:xfrm>
-            <a:off x="6539081" y="2554692"/>
+            <a:off x="7347891" y="3269799"/>
             <a:ext cx="4699591" cy="4423145"/>
             <a:chOff x="1275906" y="2169041"/>
             <a:chExt cx="4699591" cy="4423145"/>
@@ -7222,10 +7387,10 @@
         </p:grpSpPr>
         <p:sp>
           <p:nvSpPr>
-            <p:cNvPr id="5" name="Rectangle: Rounded Corners 4">
+            <p:cNvPr id="7" name="Rectangle: Rounded Corners 6">
               <a:extLst>
                 <a:ext uri="{FF2B5EF4-FFF2-40B4-BE49-F238E27FC236}">
-                  <a16:creationId xmlns:a16="http://schemas.microsoft.com/office/drawing/2014/main" id="{A5CB5EAF-261C-4DBA-A1C9-DF82E77B2F09}"/>
+                  <a16:creationId xmlns:a16="http://schemas.microsoft.com/office/drawing/2014/main" id="{FB4F018B-BEEC-4189-8778-123E90C10A33}"/>
                 </a:ext>
               </a:extLst>
             </p:cNvPr>
@@ -7294,10 +7459,10 @@
         </p:sp>
         <p:sp>
           <p:nvSpPr>
-            <p:cNvPr id="6" name="Rectangle: Rounded Corners 5">
+            <p:cNvPr id="8" name="Rectangle: Rounded Corners 7">
               <a:extLst>
                 <a:ext uri="{FF2B5EF4-FFF2-40B4-BE49-F238E27FC236}">
-                  <a16:creationId xmlns:a16="http://schemas.microsoft.com/office/drawing/2014/main" id="{203D307B-2373-4A75-BB9A-BB8B827981C8}"/>
+                  <a16:creationId xmlns:a16="http://schemas.microsoft.com/office/drawing/2014/main" id="{BE6661C3-0CA3-4204-99B3-28D99F3E43B8}"/>
                 </a:ext>
               </a:extLst>
             </p:cNvPr>
@@ -7313,7 +7478,7 @@
               <a:avLst/>
             </a:prstGeom>
             <a:blipFill>
-              <a:blip r:embed="rId2"/>
+              <a:blip r:embed="rId3"/>
               <a:stretch>
                 <a:fillRect/>
               </a:stretch>
@@ -7347,10 +7512,10 @@
       </p:grpSp>
       <p:grpSp>
         <p:nvGrpSpPr>
-          <p:cNvPr id="7" name="Group 6">
-            <a:extLst>
-              <a:ext uri="{FF2B5EF4-FFF2-40B4-BE49-F238E27FC236}">
-                <a16:creationId xmlns:a16="http://schemas.microsoft.com/office/drawing/2014/main" id="{FDB98C0C-44F2-4A5B-8972-14DFAABF6E5F}"/>
+          <p:cNvPr id="12" name="Group 11">
+            <a:extLst>
+              <a:ext uri="{FF2B5EF4-FFF2-40B4-BE49-F238E27FC236}">
+                <a16:creationId xmlns:a16="http://schemas.microsoft.com/office/drawing/2014/main" id="{079B246E-BDE2-418A-8781-1AF02D9BADA6}"/>
               </a:ext>
             </a:extLst>
           </p:cNvPr>
@@ -7358,8 +7523,8 @@
           <p:nvPr/>
         </p:nvGrpSpPr>
         <p:grpSpPr>
-          <a:xfrm rot="20596351">
-            <a:off x="7589882" y="2721261"/>
+          <a:xfrm>
+            <a:off x="9049099" y="3638703"/>
             <a:ext cx="1297174" cy="1988407"/>
             <a:chOff x="2634376" y="6012871"/>
             <a:chExt cx="1297174" cy="1988407"/>
@@ -7367,10 +7532,10 @@
         </p:grpSpPr>
         <p:sp>
           <p:nvSpPr>
-            <p:cNvPr id="8" name="Oval 7">
+            <p:cNvPr id="13" name="Oval 12">
               <a:extLst>
                 <a:ext uri="{FF2B5EF4-FFF2-40B4-BE49-F238E27FC236}">
-                  <a16:creationId xmlns:a16="http://schemas.microsoft.com/office/drawing/2014/main" id="{69B77D90-2747-4AE2-8A6B-CA24D7CDD41A}"/>
+                  <a16:creationId xmlns:a16="http://schemas.microsoft.com/office/drawing/2014/main" id="{AB9283C1-343E-402C-8E1D-76B6EA32C7CD}"/>
                 </a:ext>
               </a:extLst>
             </p:cNvPr>
@@ -7421,10 +7586,10 @@
         </p:sp>
         <p:sp>
           <p:nvSpPr>
-            <p:cNvPr id="9" name="Trapezoid 8">
+            <p:cNvPr id="14" name="Trapezoid 13">
               <a:extLst>
                 <a:ext uri="{FF2B5EF4-FFF2-40B4-BE49-F238E27FC236}">
-                  <a16:creationId xmlns:a16="http://schemas.microsoft.com/office/drawing/2014/main" id="{8528B463-79DD-4AE5-961E-C5525F3086BD}"/>
+                  <a16:creationId xmlns:a16="http://schemas.microsoft.com/office/drawing/2014/main" id="{6BB89F62-918A-4C84-8A5B-7604D00C8D28}"/>
                 </a:ext>
               </a:extLst>
             </p:cNvPr>
@@ -7476,10 +7641,10 @@
       </p:grpSp>
       <p:grpSp>
         <p:nvGrpSpPr>
-          <p:cNvPr id="10" name="Group 9">
-            <a:extLst>
-              <a:ext uri="{FF2B5EF4-FFF2-40B4-BE49-F238E27FC236}">
-                <a16:creationId xmlns:a16="http://schemas.microsoft.com/office/drawing/2014/main" id="{B775DA9F-3EF9-4A1F-952C-5971A6A02B99}"/>
+          <p:cNvPr id="15" name="Group 14">
+            <a:extLst>
+              <a:ext uri="{FF2B5EF4-FFF2-40B4-BE49-F238E27FC236}">
+                <a16:creationId xmlns:a16="http://schemas.microsoft.com/office/drawing/2014/main" id="{6BB1EDC0-08BB-46EF-867E-A334E2C892C7}"/>
               </a:ext>
             </a:extLst>
           </p:cNvPr>
@@ -7487,8 +7652,8 @@
           <p:nvPr/>
         </p:nvGrpSpPr>
         <p:grpSpPr>
-          <a:xfrm>
-            <a:off x="8240289" y="2923596"/>
+          <a:xfrm rot="1678030">
+            <a:off x="9544005" y="3831087"/>
             <a:ext cx="1297174" cy="1988407"/>
             <a:chOff x="2634376" y="6012871"/>
             <a:chExt cx="1297174" cy="1988407"/>
@@ -7496,10 +7661,10 @@
         </p:grpSpPr>
         <p:sp>
           <p:nvSpPr>
-            <p:cNvPr id="11" name="Oval 10">
+            <p:cNvPr id="16" name="Oval 15">
               <a:extLst>
                 <a:ext uri="{FF2B5EF4-FFF2-40B4-BE49-F238E27FC236}">
-                  <a16:creationId xmlns:a16="http://schemas.microsoft.com/office/drawing/2014/main" id="{8736F1F3-07AA-4DFA-91E0-D6A10597ADC6}"/>
+                  <a16:creationId xmlns:a16="http://schemas.microsoft.com/office/drawing/2014/main" id="{8C5B9A97-AF2D-4BB8-B808-49EBAE6C7E4F}"/>
                 </a:ext>
               </a:extLst>
             </p:cNvPr>
@@ -7550,10 +7715,10 @@
         </p:sp>
         <p:sp>
           <p:nvSpPr>
-            <p:cNvPr id="12" name="Trapezoid 11">
+            <p:cNvPr id="17" name="Trapezoid 16">
               <a:extLst>
                 <a:ext uri="{FF2B5EF4-FFF2-40B4-BE49-F238E27FC236}">
-                  <a16:creationId xmlns:a16="http://schemas.microsoft.com/office/drawing/2014/main" id="{ACC82F78-F484-4D56-9424-8BE81B2951FA}"/>
+                  <a16:creationId xmlns:a16="http://schemas.microsoft.com/office/drawing/2014/main" id="{0887CDF2-4C7F-4661-AFB5-5BC64E35A0DB}"/>
                 </a:ext>
               </a:extLst>
             </p:cNvPr>
@@ -7598,17 +7763,167 @@
             <a:lstStyle/>
             <a:p>
               <a:pPr algn="ctr"/>
-              <a:endParaRPr lang="en-US"/>
+              <a:endParaRPr lang="en-US" dirty="0"/>
             </a:p>
           </p:txBody>
         </p:sp>
       </p:grpSp>
+      <p:sp>
+        <p:nvSpPr>
+          <p:cNvPr id="20" name="Oval 19">
+            <a:extLst>
+              <a:ext uri="{FF2B5EF4-FFF2-40B4-BE49-F238E27FC236}">
+                <a16:creationId xmlns:a16="http://schemas.microsoft.com/office/drawing/2014/main" id="{80444A88-B576-4F32-9281-C61DA1BA8708}"/>
+              </a:ext>
+            </a:extLst>
+          </p:cNvPr>
+          <p:cNvSpPr/>
+          <p:nvPr/>
+        </p:nvSpPr>
+        <p:spPr>
+          <a:xfrm>
+            <a:off x="9993176" y="3387947"/>
+            <a:ext cx="1406764" cy="985086"/>
+          </a:xfrm>
+          <a:prstGeom prst="ellipse">
+            <a:avLst/>
+          </a:prstGeom>
+          <a:scene3d>
+            <a:camera prst="isometricTopUp"/>
+            <a:lightRig rig="threePt" dir="t"/>
+          </a:scene3d>
+          <a:sp3d extrusionH="88900">
+            <a:bevelT prst="angle"/>
+            <a:bevelB w="152400" h="50800" prst="softRound"/>
+          </a:sp3d>
+        </p:spPr>
+        <p:style>
+          <a:lnRef idx="2">
+            <a:schemeClr val="accent1">
+              <a:shade val="50000"/>
+            </a:schemeClr>
+          </a:lnRef>
+          <a:fillRef idx="1">
+            <a:schemeClr val="accent1"/>
+          </a:fillRef>
+          <a:effectRef idx="0">
+            <a:schemeClr val="accent1"/>
+          </a:effectRef>
+          <a:fontRef idx="minor">
+            <a:schemeClr val="lt1"/>
+          </a:fontRef>
+        </p:style>
+        <p:txBody>
+          <a:bodyPr rtlCol="0" anchor="ctr"/>
+          <a:lstStyle/>
+          <a:p>
+            <a:pPr algn="ctr"/>
+            <a:r>
+              <a:rPr lang="en-US" sz="1400" dirty="0"/>
+              <a:t>HIT Viewpoint</a:t>
+            </a:r>
+          </a:p>
+        </p:txBody>
+      </p:sp>
+      <p:sp>
+        <p:nvSpPr>
+          <p:cNvPr id="24" name="Arrow: Left 23">
+            <a:extLst>
+              <a:ext uri="{FF2B5EF4-FFF2-40B4-BE49-F238E27FC236}">
+                <a16:creationId xmlns:a16="http://schemas.microsoft.com/office/drawing/2014/main" id="{0C3F5544-9F7F-4D8E-95E3-9803D7465F12}"/>
+              </a:ext>
+            </a:extLst>
+          </p:cNvPr>
+          <p:cNvSpPr/>
+          <p:nvPr/>
+        </p:nvSpPr>
+        <p:spPr>
+          <a:xfrm>
+            <a:off x="6526367" y="4591639"/>
+            <a:ext cx="2675309" cy="131918"/>
+          </a:xfrm>
+          <a:prstGeom prst="leftArrow">
+            <a:avLst/>
+          </a:prstGeom>
+          <a:solidFill>
+            <a:schemeClr val="accent4">
+              <a:lumMod val="75000"/>
+            </a:schemeClr>
+          </a:solidFill>
+          <a:ln>
+            <a:noFill/>
+          </a:ln>
+        </p:spPr>
+        <p:style>
+          <a:lnRef idx="2">
+            <a:schemeClr val="accent1">
+              <a:shade val="50000"/>
+            </a:schemeClr>
+          </a:lnRef>
+          <a:fillRef idx="1">
+            <a:schemeClr val="accent1"/>
+          </a:fillRef>
+          <a:effectRef idx="0">
+            <a:schemeClr val="accent1"/>
+          </a:effectRef>
+          <a:fontRef idx="minor">
+            <a:schemeClr val="lt1"/>
+          </a:fontRef>
+        </p:style>
+        <p:txBody>
+          <a:bodyPr rtlCol="0" anchor="ctr"/>
+          <a:lstStyle/>
+          <a:p>
+            <a:pPr algn="ctr"/>
+            <a:endParaRPr lang="en-US"/>
+          </a:p>
+        </p:txBody>
+      </p:sp>
+      <p:pic>
+        <p:nvPicPr>
+          <p:cNvPr id="23" name="Picture 22" descr="Icon&#10;&#10;Description automatically generated">
+            <a:extLst>
+              <a:ext uri="{FF2B5EF4-FFF2-40B4-BE49-F238E27FC236}">
+                <a16:creationId xmlns:a16="http://schemas.microsoft.com/office/drawing/2014/main" id="{470664A5-890D-4CFB-8DAC-1D68872AD2DD}"/>
+              </a:ext>
+            </a:extLst>
+          </p:cNvPr>
+          <p:cNvPicPr>
+            <a:picLocks noChangeAspect="1"/>
+          </p:cNvPicPr>
+          <p:nvPr/>
+        </p:nvPicPr>
+        <p:blipFill>
+          <a:blip r:embed="rId4">
+            <a:extLst>
+              <a:ext uri="{28A0092B-C50C-407E-A947-70E740481C1C}">
+                <a14:useLocalDpi xmlns:a14="http://schemas.microsoft.com/office/drawing/2010/main" val="0"/>
+              </a:ext>
+              <a:ext uri="{837473B0-CC2E-450A-ABE3-18F120FF3D39}">
+                <a1611:picAttrSrcUrl xmlns:a1611="http://schemas.microsoft.com/office/drawing/2016/11/main" r:id="rId5"/>
+              </a:ext>
+            </a:extLst>
+          </a:blip>
+          <a:stretch>
+            <a:fillRect/>
+          </a:stretch>
+        </p:blipFill>
+        <p:spPr>
+          <a:xfrm>
+            <a:off x="10660833" y="4355717"/>
+            <a:ext cx="1531167" cy="1456328"/>
+          </a:xfrm>
+          <a:prstGeom prst="rect">
+            <a:avLst/>
+          </a:prstGeom>
+        </p:spPr>
+      </p:pic>
       <p:grpSp>
         <p:nvGrpSpPr>
-          <p:cNvPr id="13" name="Group 12">
-            <a:extLst>
-              <a:ext uri="{FF2B5EF4-FFF2-40B4-BE49-F238E27FC236}">
-                <a16:creationId xmlns:a16="http://schemas.microsoft.com/office/drawing/2014/main" id="{F139FFE8-67BE-43C5-878F-45ACC10B907F}"/>
+          <p:cNvPr id="9" name="Group 8">
+            <a:extLst>
+              <a:ext uri="{FF2B5EF4-FFF2-40B4-BE49-F238E27FC236}">
+                <a16:creationId xmlns:a16="http://schemas.microsoft.com/office/drawing/2014/main" id="{6FD1F94D-7910-4DD7-AD33-4AE6BF5C7FC4}"/>
               </a:ext>
             </a:extLst>
           </p:cNvPr>
@@ -7616,8 +7931,8 @@
           <p:nvPr/>
         </p:nvGrpSpPr>
         <p:grpSpPr>
-          <a:xfrm rot="1678030">
-            <a:off x="8735195" y="3115980"/>
+          <a:xfrm rot="20596351">
+            <a:off x="8398692" y="3436368"/>
             <a:ext cx="1297174" cy="1988407"/>
             <a:chOff x="2634376" y="6012871"/>
             <a:chExt cx="1297174" cy="1988407"/>
@@ -7625,10 +7940,10 @@
         </p:grpSpPr>
         <p:sp>
           <p:nvSpPr>
-            <p:cNvPr id="14" name="Oval 13">
+            <p:cNvPr id="10" name="Oval 9">
               <a:extLst>
                 <a:ext uri="{FF2B5EF4-FFF2-40B4-BE49-F238E27FC236}">
-                  <a16:creationId xmlns:a16="http://schemas.microsoft.com/office/drawing/2014/main" id="{3DA71C96-5DE0-4E13-A0FF-2A095E77CFF1}"/>
+                  <a16:creationId xmlns:a16="http://schemas.microsoft.com/office/drawing/2014/main" id="{2A83009C-15E5-4AE5-A6C7-5F4DF0A87CE3}"/>
                 </a:ext>
               </a:extLst>
             </p:cNvPr>
@@ -7679,10 +7994,10 @@
         </p:sp>
         <p:sp>
           <p:nvSpPr>
-            <p:cNvPr id="15" name="Trapezoid 14">
+            <p:cNvPr id="11" name="Trapezoid 10">
               <a:extLst>
                 <a:ext uri="{FF2B5EF4-FFF2-40B4-BE49-F238E27FC236}">
-                  <a16:creationId xmlns:a16="http://schemas.microsoft.com/office/drawing/2014/main" id="{33AE459C-C8D7-478F-8430-0DCA81ECA520}"/>
+                  <a16:creationId xmlns:a16="http://schemas.microsoft.com/office/drawing/2014/main" id="{7A7D1C92-1EFD-42FD-8ED5-C679B0F7F0A9}"/>
                 </a:ext>
               </a:extLst>
             </p:cNvPr>
@@ -7727,17 +8042,17 @@
             <a:lstStyle/>
             <a:p>
               <a:pPr algn="ctr"/>
-              <a:endParaRPr lang="en-US" dirty="0"/>
+              <a:endParaRPr lang="en-US"/>
             </a:p>
           </p:txBody>
         </p:sp>
       </p:grpSp>
       <p:sp>
         <p:nvSpPr>
-          <p:cNvPr id="16" name="Oval 15">
-            <a:extLst>
-              <a:ext uri="{FF2B5EF4-FFF2-40B4-BE49-F238E27FC236}">
-                <a16:creationId xmlns:a16="http://schemas.microsoft.com/office/drawing/2014/main" id="{9D73CE9A-270E-4675-9DA3-9E82F9DF1038}"/>
+          <p:cNvPr id="18" name="Oval 17">
+            <a:extLst>
+              <a:ext uri="{FF2B5EF4-FFF2-40B4-BE49-F238E27FC236}">
+                <a16:creationId xmlns:a16="http://schemas.microsoft.com/office/drawing/2014/main" id="{F361A198-D358-457A-9F1D-D9A8A3206CAE}"/>
               </a:ext>
             </a:extLst>
           </p:cNvPr>
@@ -7746,7 +8061,7 @@
         </p:nvSpPr>
         <p:spPr>
           <a:xfrm>
-            <a:off x="7257647" y="1903615"/>
+            <a:off x="8066457" y="2618722"/>
             <a:ext cx="1406764" cy="985086"/>
           </a:xfrm>
           <a:prstGeom prst="ellipse">
@@ -7796,12 +8111,48 @@
           </a:p>
         </p:txBody>
       </p:sp>
-      <p:sp>
-        <p:nvSpPr>
-          <p:cNvPr id="17" name="Oval 16">
-            <a:extLst>
-              <a:ext uri="{FF2B5EF4-FFF2-40B4-BE49-F238E27FC236}">
-                <a16:creationId xmlns:a16="http://schemas.microsoft.com/office/drawing/2014/main" id="{304B28E0-F005-4CD5-A0FC-E83FF377DA86}"/>
+      <p:pic>
+        <p:nvPicPr>
+          <p:cNvPr id="21" name="Picture 20" descr="Doctor writing">
+            <a:extLst>
+              <a:ext uri="{FF2B5EF4-FFF2-40B4-BE49-F238E27FC236}">
+                <a16:creationId xmlns:a16="http://schemas.microsoft.com/office/drawing/2014/main" id="{3DDA801B-A397-4A84-8839-3287F25967DB}"/>
+              </a:ext>
+            </a:extLst>
+          </p:cNvPr>
+          <p:cNvPicPr>
+            <a:picLocks noChangeAspect="1"/>
+          </p:cNvPicPr>
+          <p:nvPr/>
+        </p:nvPicPr>
+        <p:blipFill>
+          <a:blip r:embed="rId6">
+            <a:extLst>
+              <a:ext uri="{28A0092B-C50C-407E-A947-70E740481C1C}">
+                <a14:useLocalDpi xmlns:a14="http://schemas.microsoft.com/office/drawing/2010/main" val="0"/>
+              </a:ext>
+            </a:extLst>
+          </a:blip>
+          <a:stretch>
+            <a:fillRect/>
+          </a:stretch>
+        </p:blipFill>
+        <p:spPr>
+          <a:xfrm flipH="1">
+            <a:off x="7078253" y="2621624"/>
+            <a:ext cx="1097793" cy="3031653"/>
+          </a:xfrm>
+          <a:prstGeom prst="rect">
+            <a:avLst/>
+          </a:prstGeom>
+        </p:spPr>
+      </p:pic>
+      <p:sp>
+        <p:nvSpPr>
+          <p:cNvPr id="22" name="Rectangle 21">
+            <a:extLst>
+              <a:ext uri="{FF2B5EF4-FFF2-40B4-BE49-F238E27FC236}">
+                <a16:creationId xmlns:a16="http://schemas.microsoft.com/office/drawing/2014/main" id="{199EC6B6-1911-4160-99EE-1BA16492FFD6}"/>
               </a:ext>
             </a:extLst>
           </p:cNvPr>
@@ -7810,7 +8161,57 @@
         </p:nvSpPr>
         <p:spPr>
           <a:xfrm>
-            <a:off x="8164230" y="2303859"/>
+            <a:off x="8749535" y="4138782"/>
+            <a:ext cx="1483098" cy="584775"/>
+          </a:xfrm>
+          <a:prstGeom prst="rect">
+            <a:avLst/>
+          </a:prstGeom>
+          <a:noFill/>
+        </p:spPr>
+        <p:txBody>
+          <a:bodyPr wrap="none" lIns="91440" tIns="45720" rIns="91440" bIns="45720">
+            <a:spAutoFit/>
+            <a:scene3d>
+              <a:camera prst="orthographicFront"/>
+              <a:lightRig rig="soft" dir="t">
+                <a:rot lat="0" lon="0" rev="15600000"/>
+              </a:lightRig>
+            </a:scene3d>
+            <a:sp3d extrusionH="57150" prstMaterial="softEdge">
+              <a:bevelT w="25400" h="38100"/>
+            </a:sp3d>
+          </a:bodyPr>
+          <a:lstStyle/>
+          <a:p>
+            <a:pPr algn="ctr"/>
+            <a:r>
+              <a:rPr lang="en-US" sz="3200" b="1" i="1" dirty="0">
+                <a:ln/>
+                <a:solidFill>
+                  <a:schemeClr val="accent4"/>
+                </a:solidFill>
+              </a:rPr>
+              <a:t>Binding</a:t>
+            </a:r>
+          </a:p>
+        </p:txBody>
+      </p:sp>
+      <p:sp>
+        <p:nvSpPr>
+          <p:cNvPr id="19" name="Oval 18">
+            <a:extLst>
+              <a:ext uri="{FF2B5EF4-FFF2-40B4-BE49-F238E27FC236}">
+                <a16:creationId xmlns:a16="http://schemas.microsoft.com/office/drawing/2014/main" id="{4034B78F-011C-4D61-A44C-E9FDB19D69FE}"/>
+              </a:ext>
+            </a:extLst>
+          </p:cNvPr>
+          <p:cNvSpPr/>
+          <p:nvPr/>
+        </p:nvSpPr>
+        <p:spPr>
+          <a:xfrm>
+            <a:off x="8973040" y="3018966"/>
             <a:ext cx="1406764" cy="985086"/>
           </a:xfrm>
           <a:prstGeom prst="ellipse">
@@ -7860,220 +8261,10 @@
           </a:p>
         </p:txBody>
       </p:sp>
-      <p:sp>
-        <p:nvSpPr>
-          <p:cNvPr id="18" name="Oval 17">
-            <a:extLst>
-              <a:ext uri="{FF2B5EF4-FFF2-40B4-BE49-F238E27FC236}">
-                <a16:creationId xmlns:a16="http://schemas.microsoft.com/office/drawing/2014/main" id="{F1CA1BEA-D925-4BA8-B9A7-B63797DF16D7}"/>
-              </a:ext>
-            </a:extLst>
-          </p:cNvPr>
-          <p:cNvSpPr/>
-          <p:nvPr/>
-        </p:nvSpPr>
-        <p:spPr>
-          <a:xfrm>
-            <a:off x="9184366" y="2672840"/>
-            <a:ext cx="1406764" cy="985086"/>
-          </a:xfrm>
-          <a:prstGeom prst="ellipse">
-            <a:avLst/>
-          </a:prstGeom>
-          <a:scene3d>
-            <a:camera prst="isometricTopUp"/>
-            <a:lightRig rig="threePt" dir="t"/>
-          </a:scene3d>
-          <a:sp3d extrusionH="88900">
-            <a:bevelT prst="angle"/>
-            <a:bevelB w="152400" h="50800" prst="softRound"/>
-          </a:sp3d>
-        </p:spPr>
-        <p:style>
-          <a:lnRef idx="2">
-            <a:schemeClr val="accent1">
-              <a:shade val="50000"/>
-            </a:schemeClr>
-          </a:lnRef>
-          <a:fillRef idx="1">
-            <a:schemeClr val="accent1"/>
-          </a:fillRef>
-          <a:effectRef idx="0">
-            <a:schemeClr val="accent1"/>
-          </a:effectRef>
-          <a:fontRef idx="minor">
-            <a:schemeClr val="lt1"/>
-          </a:fontRef>
-        </p:style>
-        <p:txBody>
-          <a:bodyPr rtlCol="0" anchor="ctr"/>
-          <a:lstStyle/>
-          <a:p>
-            <a:pPr algn="ctr"/>
-            <a:r>
-              <a:rPr lang="en-US" sz="1400" dirty="0"/>
-              <a:t>HIT Viewpoint</a:t>
-            </a:r>
-          </a:p>
-        </p:txBody>
-      </p:sp>
-      <p:pic>
-        <p:nvPicPr>
-          <p:cNvPr id="19" name="Picture 18" descr="Doctor writing">
-            <a:extLst>
-              <a:ext uri="{FF2B5EF4-FFF2-40B4-BE49-F238E27FC236}">
-                <a16:creationId xmlns:a16="http://schemas.microsoft.com/office/drawing/2014/main" id="{AABB4540-8A9E-4C12-BDE5-37B85A89934F}"/>
-              </a:ext>
-            </a:extLst>
-          </p:cNvPr>
-          <p:cNvPicPr>
-            <a:picLocks noChangeAspect="1"/>
-          </p:cNvPicPr>
-          <p:nvPr/>
-        </p:nvPicPr>
-        <p:blipFill>
-          <a:blip r:embed="rId3">
-            <a:extLst>
-              <a:ext uri="{28A0092B-C50C-407E-A947-70E740481C1C}">
-                <a14:useLocalDpi xmlns:a14="http://schemas.microsoft.com/office/drawing/2010/main" val="0"/>
-              </a:ext>
-            </a:extLst>
-          </a:blip>
-          <a:stretch>
-            <a:fillRect/>
-          </a:stretch>
-        </p:blipFill>
-        <p:spPr>
-          <a:xfrm flipH="1">
-            <a:off x="6269443" y="1906517"/>
-            <a:ext cx="1097793" cy="3031653"/>
-          </a:xfrm>
-          <a:prstGeom prst="rect">
-            <a:avLst/>
-          </a:prstGeom>
-        </p:spPr>
-      </p:pic>
-      <p:sp>
-        <p:nvSpPr>
-          <p:cNvPr id="20" name="Rectangle 19">
-            <a:extLst>
-              <a:ext uri="{FF2B5EF4-FFF2-40B4-BE49-F238E27FC236}">
-                <a16:creationId xmlns:a16="http://schemas.microsoft.com/office/drawing/2014/main" id="{E1CC6CF5-0699-42A0-BCAC-760AC0FFD9F7}"/>
-              </a:ext>
-            </a:extLst>
-          </p:cNvPr>
-          <p:cNvSpPr/>
-          <p:nvPr/>
-        </p:nvSpPr>
-        <p:spPr>
-          <a:xfrm>
-            <a:off x="7940725" y="3423675"/>
-            <a:ext cx="1483098" cy="584775"/>
-          </a:xfrm>
-          <a:prstGeom prst="rect">
-            <a:avLst/>
-          </a:prstGeom>
-          <a:noFill/>
-        </p:spPr>
-        <p:txBody>
-          <a:bodyPr wrap="none" lIns="91440" tIns="45720" rIns="91440" bIns="45720">
-            <a:spAutoFit/>
-            <a:scene3d>
-              <a:camera prst="orthographicFront"/>
-              <a:lightRig rig="soft" dir="t">
-                <a:rot lat="0" lon="0" rev="15600000"/>
-              </a:lightRig>
-            </a:scene3d>
-            <a:sp3d extrusionH="57150" prstMaterial="softEdge">
-              <a:bevelT w="25400" h="38100"/>
-            </a:sp3d>
-          </a:bodyPr>
-          <a:lstStyle/>
-          <a:p>
-            <a:pPr algn="ctr"/>
-            <a:r>
-              <a:rPr lang="en-US" sz="3200" b="1" i="1" dirty="0">
-                <a:ln/>
-                <a:solidFill>
-                  <a:schemeClr val="accent4"/>
-                </a:solidFill>
-              </a:rPr>
-              <a:t>Binding</a:t>
-            </a:r>
-          </a:p>
-        </p:txBody>
-      </p:sp>
-      <p:pic>
-        <p:nvPicPr>
-          <p:cNvPr id="21" name="Picture 20" descr="Icon&#10;&#10;Description automatically generated">
-            <a:extLst>
-              <a:ext uri="{FF2B5EF4-FFF2-40B4-BE49-F238E27FC236}">
-                <a16:creationId xmlns:a16="http://schemas.microsoft.com/office/drawing/2014/main" id="{EC8CCBED-DE43-4547-A42B-98DB2E072411}"/>
-              </a:ext>
-            </a:extLst>
-          </p:cNvPr>
-          <p:cNvPicPr>
-            <a:picLocks noChangeAspect="1"/>
-          </p:cNvPicPr>
-          <p:nvPr/>
-        </p:nvPicPr>
-        <p:blipFill>
-          <a:blip r:embed="rId4">
-            <a:extLst>
-              <a:ext uri="{28A0092B-C50C-407E-A947-70E740481C1C}">
-                <a14:useLocalDpi xmlns:a14="http://schemas.microsoft.com/office/drawing/2010/main" val="0"/>
-              </a:ext>
-              <a:ext uri="{837473B0-CC2E-450A-ABE3-18F120FF3D39}">
-                <a1611:picAttrSrcUrl xmlns:a1611="http://schemas.microsoft.com/office/drawing/2016/11/main" r:id="rId5"/>
-              </a:ext>
-            </a:extLst>
-          </a:blip>
-          <a:stretch>
-            <a:fillRect/>
-          </a:stretch>
-        </p:blipFill>
-        <p:spPr>
-          <a:xfrm>
-            <a:off x="9852023" y="3640610"/>
-            <a:ext cx="1531167" cy="1456328"/>
-          </a:xfrm>
-          <a:prstGeom prst="rect">
-            <a:avLst/>
-          </a:prstGeom>
-        </p:spPr>
-      </p:pic>
-      <p:sp>
-        <p:nvSpPr>
-          <p:cNvPr id="22" name="Title 21">
-            <a:extLst>
-              <a:ext uri="{FF2B5EF4-FFF2-40B4-BE49-F238E27FC236}">
-                <a16:creationId xmlns:a16="http://schemas.microsoft.com/office/drawing/2014/main" id="{B5D4C466-76C1-4261-BAB8-A046F30FF8AC}"/>
-              </a:ext>
-            </a:extLst>
-          </p:cNvPr>
-          <p:cNvSpPr>
-            <a:spLocks noGrp="1"/>
-          </p:cNvSpPr>
-          <p:nvPr>
-            <p:ph type="title"/>
-          </p:nvPr>
-        </p:nvSpPr>
-        <p:spPr/>
-        <p:txBody>
-          <a:bodyPr/>
-          <a:lstStyle/>
-          <a:p>
-            <a:r>
-              <a:rPr lang="en-US" dirty="0"/>
-              <a:t>spare</a:t>
-            </a:r>
-          </a:p>
-        </p:txBody>
-      </p:sp>
     </p:spTree>
     <p:extLst>
       <p:ext uri="{BB962C8B-B14F-4D97-AF65-F5344CB8AC3E}">
-        <p14:creationId xmlns:p14="http://schemas.microsoft.com/office/powerpoint/2010/main" val="261066504"/>
+        <p14:creationId xmlns:p14="http://schemas.microsoft.com/office/powerpoint/2010/main" val="3924723681"/>
       </p:ext>
     </p:extLst>
   </p:cSld>

</xml_diff>